<commit_message>
merge poprf data path
</commit_message>
<xml_diff>
--- a/EC_FINAL_PROJECT/EC_FINAL_PROJECT/doc/flow.pptx
+++ b/EC_FINAL_PROJECT/EC_FINAL_PROJECT/doc/flow.pptx
@@ -105,6 +105,11 @@
       </a:defRPr>
     </a:lvl9pPr>
   </p:defaultTextStyle>
+  <p:extLst>
+    <p:ext uri="{EFAFB233-063F-42B5-8137-9DF3F51BA10A}">
+      <p15:sldGuideLst xmlns:p15="http://schemas.microsoft.com/office/powerpoint/2012/main"/>
+    </p:ext>
+  </p:extLst>
 </p:presentation>
 </file>
 
@@ -239,7 +244,7 @@
           <a:p>
             <a:fld id="{DEF41FD4-94AC-4735-8F19-E491163C3B43}" type="datetimeFigureOut">
               <a:rPr lang="zh-TW" altLang="en-US" smtClean="0"/>
-              <a:t>2022/12/7</a:t>
+              <a:t>2022/12/12</a:t>
             </a:fld>
             <a:endParaRPr lang="zh-TW" altLang="en-US"/>
           </a:p>
@@ -409,7 +414,7 @@
           <a:p>
             <a:fld id="{DEF41FD4-94AC-4735-8F19-E491163C3B43}" type="datetimeFigureOut">
               <a:rPr lang="zh-TW" altLang="en-US" smtClean="0"/>
-              <a:t>2022/12/7</a:t>
+              <a:t>2022/12/12</a:t>
             </a:fld>
             <a:endParaRPr lang="zh-TW" altLang="en-US"/>
           </a:p>
@@ -589,7 +594,7 @@
           <a:p>
             <a:fld id="{DEF41FD4-94AC-4735-8F19-E491163C3B43}" type="datetimeFigureOut">
               <a:rPr lang="zh-TW" altLang="en-US" smtClean="0"/>
-              <a:t>2022/12/7</a:t>
+              <a:t>2022/12/12</a:t>
             </a:fld>
             <a:endParaRPr lang="zh-TW" altLang="en-US"/>
           </a:p>
@@ -759,7 +764,7 @@
           <a:p>
             <a:fld id="{DEF41FD4-94AC-4735-8F19-E491163C3B43}" type="datetimeFigureOut">
               <a:rPr lang="zh-TW" altLang="en-US" smtClean="0"/>
-              <a:t>2022/12/7</a:t>
+              <a:t>2022/12/12</a:t>
             </a:fld>
             <a:endParaRPr lang="zh-TW" altLang="en-US"/>
           </a:p>
@@ -1003,7 +1008,7 @@
           <a:p>
             <a:fld id="{DEF41FD4-94AC-4735-8F19-E491163C3B43}" type="datetimeFigureOut">
               <a:rPr lang="zh-TW" altLang="en-US" smtClean="0"/>
-              <a:t>2022/12/7</a:t>
+              <a:t>2022/12/12</a:t>
             </a:fld>
             <a:endParaRPr lang="zh-TW" altLang="en-US"/>
           </a:p>
@@ -1235,7 +1240,7 @@
           <a:p>
             <a:fld id="{DEF41FD4-94AC-4735-8F19-E491163C3B43}" type="datetimeFigureOut">
               <a:rPr lang="zh-TW" altLang="en-US" smtClean="0"/>
-              <a:t>2022/12/7</a:t>
+              <a:t>2022/12/12</a:t>
             </a:fld>
             <a:endParaRPr lang="zh-TW" altLang="en-US"/>
           </a:p>
@@ -1602,7 +1607,7 @@
           <a:p>
             <a:fld id="{DEF41FD4-94AC-4735-8F19-E491163C3B43}" type="datetimeFigureOut">
               <a:rPr lang="zh-TW" altLang="en-US" smtClean="0"/>
-              <a:t>2022/12/7</a:t>
+              <a:t>2022/12/12</a:t>
             </a:fld>
             <a:endParaRPr lang="zh-TW" altLang="en-US"/>
           </a:p>
@@ -1720,7 +1725,7 @@
           <a:p>
             <a:fld id="{DEF41FD4-94AC-4735-8F19-E491163C3B43}" type="datetimeFigureOut">
               <a:rPr lang="zh-TW" altLang="en-US" smtClean="0"/>
-              <a:t>2022/12/7</a:t>
+              <a:t>2022/12/12</a:t>
             </a:fld>
             <a:endParaRPr lang="zh-TW" altLang="en-US"/>
           </a:p>
@@ -1815,7 +1820,7 @@
           <a:p>
             <a:fld id="{DEF41FD4-94AC-4735-8F19-E491163C3B43}" type="datetimeFigureOut">
               <a:rPr lang="zh-TW" altLang="en-US" smtClean="0"/>
-              <a:t>2022/12/7</a:t>
+              <a:t>2022/12/12</a:t>
             </a:fld>
             <a:endParaRPr lang="zh-TW" altLang="en-US"/>
           </a:p>
@@ -2092,7 +2097,7 @@
           <a:p>
             <a:fld id="{DEF41FD4-94AC-4735-8F19-E491163C3B43}" type="datetimeFigureOut">
               <a:rPr lang="zh-TW" altLang="en-US" smtClean="0"/>
-              <a:t>2022/12/7</a:t>
+              <a:t>2022/12/12</a:t>
             </a:fld>
             <a:endParaRPr lang="zh-TW" altLang="en-US"/>
           </a:p>
@@ -2349,7 +2354,7 @@
           <a:p>
             <a:fld id="{DEF41FD4-94AC-4735-8F19-E491163C3B43}" type="datetimeFigureOut">
               <a:rPr lang="zh-TW" altLang="en-US" smtClean="0"/>
-              <a:t>2022/12/7</a:t>
+              <a:t>2022/12/12</a:t>
             </a:fld>
             <a:endParaRPr lang="zh-TW" altLang="en-US"/>
           </a:p>
@@ -2562,7 +2567,7 @@
           <a:p>
             <a:fld id="{DEF41FD4-94AC-4735-8F19-E491163C3B43}" type="datetimeFigureOut">
               <a:rPr lang="zh-TW" altLang="en-US" smtClean="0"/>
-              <a:t>2022/12/7</a:t>
+              <a:t>2022/12/12</a:t>
             </a:fld>
             <a:endParaRPr lang="zh-TW" altLang="en-US"/>
           </a:p>
@@ -3016,7 +3021,7 @@
             <a:pPr algn="ctr"/>
             <a:r>
               <a:rPr lang="en-US" altLang="zh-TW" sz="1013" dirty="0"/>
-              <a:t>COPY_POP</a:t>
+              <a:t>CONDUCT_TOUR</a:t>
             </a:r>
             <a:endParaRPr lang="zh-TW" altLang="en-US" sz="1013" dirty="0"/>
           </a:p>
@@ -3112,7 +3117,7 @@
             <a:pPr algn="ctr"/>
             <a:r>
               <a:rPr lang="en-US" altLang="zh-TW" sz="1013" dirty="0"/>
-              <a:t>CONDUCT_TOUR</a:t>
+              <a:t>CROSSOVER</a:t>
             </a:r>
             <a:endParaRPr lang="zh-TW" altLang="en-US" sz="1013" dirty="0"/>
           </a:p>
@@ -3462,6 +3467,100 @@
           </a:p>
         </p:txBody>
       </p:sp>
+      <p:sp>
+        <p:nvSpPr>
+          <p:cNvPr id="15" name="矩形 14">
+            <a:extLst>
+              <a:ext uri="{FF2B5EF4-FFF2-40B4-BE49-F238E27FC236}">
+                <a16:creationId xmlns:a16="http://schemas.microsoft.com/office/drawing/2014/main" id="{A79696E1-B9D9-455C-8C26-6024C1276FAE}"/>
+              </a:ext>
+            </a:extLst>
+          </p:cNvPr>
+          <p:cNvSpPr/>
+          <p:nvPr/>
+        </p:nvSpPr>
+        <p:spPr>
+          <a:xfrm>
+            <a:off x="2898834" y="3692787"/>
+            <a:ext cx="1060327" cy="409482"/>
+          </a:xfrm>
+          <a:prstGeom prst="rect">
+            <a:avLst/>
+          </a:prstGeom>
+        </p:spPr>
+        <p:style>
+          <a:lnRef idx="2">
+            <a:schemeClr val="accent1">
+              <a:shade val="50000"/>
+            </a:schemeClr>
+          </a:lnRef>
+          <a:fillRef idx="1">
+            <a:schemeClr val="accent1"/>
+          </a:fillRef>
+          <a:effectRef idx="0">
+            <a:schemeClr val="accent1"/>
+          </a:effectRef>
+          <a:fontRef idx="minor">
+            <a:schemeClr val="lt1"/>
+          </a:fontRef>
+        </p:style>
+        <p:txBody>
+          <a:bodyPr rot="0" spcFirstLastPara="0" vertOverflow="overflow" horzOverflow="overflow" vert="horz" wrap="square" lIns="51435" tIns="25718" rIns="51435" bIns="25718" numCol="1" spcCol="0" rtlCol="0" fromWordArt="0" anchor="ctr" anchorCtr="0" forceAA="0" compatLnSpc="1">
+            <a:prstTxWarp prst="textNoShape">
+              <a:avLst/>
+            </a:prstTxWarp>
+            <a:noAutofit/>
+          </a:bodyPr>
+          <a:lstStyle/>
+          <a:p>
+            <a:pPr algn="ctr"/>
+            <a:r>
+              <a:rPr lang="en-US" altLang="zh-TW" sz="1013" dirty="0"/>
+              <a:t>COPY_POP</a:t>
+            </a:r>
+            <a:endParaRPr lang="zh-TW" altLang="en-US" sz="1013" dirty="0"/>
+          </a:p>
+        </p:txBody>
+      </p:sp>
+      <p:cxnSp>
+        <p:nvCxnSpPr>
+          <p:cNvPr id="16" name="直線單箭頭接點 15">
+            <a:extLst>
+              <a:ext uri="{FF2B5EF4-FFF2-40B4-BE49-F238E27FC236}">
+                <a16:creationId xmlns:a16="http://schemas.microsoft.com/office/drawing/2014/main" id="{30AB8F3F-E132-42B9-BE2C-B2AD427C27F7}"/>
+              </a:ext>
+            </a:extLst>
+          </p:cNvPr>
+          <p:cNvCxnSpPr/>
+          <p:nvPr/>
+        </p:nvCxnSpPr>
+        <p:spPr>
+          <a:xfrm flipH="1">
+            <a:off x="3428996" y="4102269"/>
+            <a:ext cx="1" cy="289635"/>
+          </a:xfrm>
+          <a:prstGeom prst="straightConnector1">
+            <a:avLst/>
+          </a:prstGeom>
+          <a:ln w="38100">
+            <a:tailEnd type="triangle"/>
+          </a:ln>
+        </p:spPr>
+        <p:style>
+          <a:lnRef idx="1">
+            <a:schemeClr val="accent1"/>
+          </a:lnRef>
+          <a:fillRef idx="0">
+            <a:schemeClr val="accent1"/>
+          </a:fillRef>
+          <a:effectRef idx="0">
+            <a:schemeClr val="accent1"/>
+          </a:effectRef>
+          <a:fontRef idx="minor">
+            <a:schemeClr val="tx1"/>
+          </a:fontRef>
+        </p:style>
+      </p:cxnSp>
     </p:spTree>
     <p:extLst>
       <p:ext uri="{BB962C8B-B14F-4D97-AF65-F5344CB8AC3E}">

</xml_diff>